<commit_message>
updated merge conflict image
</commit_message>
<xml_diff>
--- a/figures/git_graphics.pptx
+++ b/figures/git_graphics.pptx
@@ -268,7 +268,7 @@
           <a:p>
             <a:fld id="{978706DF-02FA-2C46-8676-E51AD8094F5E}" type="datetimeFigureOut">
               <a:rPr lang="en-US" smtClean="0"/>
-              <a:t>5/1/24</a:t>
+              <a:t>5/2/24</a:t>
             </a:fld>
             <a:endParaRPr lang="en-US"/>
           </a:p>
@@ -466,7 +466,7 @@
           <a:p>
             <a:fld id="{978706DF-02FA-2C46-8676-E51AD8094F5E}" type="datetimeFigureOut">
               <a:rPr lang="en-US" smtClean="0"/>
-              <a:t>5/1/24</a:t>
+              <a:t>5/2/24</a:t>
             </a:fld>
             <a:endParaRPr lang="en-US"/>
           </a:p>
@@ -674,7 +674,7 @@
           <a:p>
             <a:fld id="{978706DF-02FA-2C46-8676-E51AD8094F5E}" type="datetimeFigureOut">
               <a:rPr lang="en-US" smtClean="0"/>
-              <a:t>5/1/24</a:t>
+              <a:t>5/2/24</a:t>
             </a:fld>
             <a:endParaRPr lang="en-US"/>
           </a:p>
@@ -872,7 +872,7 @@
           <a:p>
             <a:fld id="{978706DF-02FA-2C46-8676-E51AD8094F5E}" type="datetimeFigureOut">
               <a:rPr lang="en-US" smtClean="0"/>
-              <a:t>5/1/24</a:t>
+              <a:t>5/2/24</a:t>
             </a:fld>
             <a:endParaRPr lang="en-US"/>
           </a:p>
@@ -1147,7 +1147,7 @@
           <a:p>
             <a:fld id="{978706DF-02FA-2C46-8676-E51AD8094F5E}" type="datetimeFigureOut">
               <a:rPr lang="en-US" smtClean="0"/>
-              <a:t>5/1/24</a:t>
+              <a:t>5/2/24</a:t>
             </a:fld>
             <a:endParaRPr lang="en-US"/>
           </a:p>
@@ -1412,7 +1412,7 @@
           <a:p>
             <a:fld id="{978706DF-02FA-2C46-8676-E51AD8094F5E}" type="datetimeFigureOut">
               <a:rPr lang="en-US" smtClean="0"/>
-              <a:t>5/1/24</a:t>
+              <a:t>5/2/24</a:t>
             </a:fld>
             <a:endParaRPr lang="en-US"/>
           </a:p>
@@ -1824,7 +1824,7 @@
           <a:p>
             <a:fld id="{978706DF-02FA-2C46-8676-E51AD8094F5E}" type="datetimeFigureOut">
               <a:rPr lang="en-US" smtClean="0"/>
-              <a:t>5/1/24</a:t>
+              <a:t>5/2/24</a:t>
             </a:fld>
             <a:endParaRPr lang="en-US"/>
           </a:p>
@@ -1965,7 +1965,7 @@
           <a:p>
             <a:fld id="{978706DF-02FA-2C46-8676-E51AD8094F5E}" type="datetimeFigureOut">
               <a:rPr lang="en-US" smtClean="0"/>
-              <a:t>5/1/24</a:t>
+              <a:t>5/2/24</a:t>
             </a:fld>
             <a:endParaRPr lang="en-US"/>
           </a:p>
@@ -2078,7 +2078,7 @@
           <a:p>
             <a:fld id="{978706DF-02FA-2C46-8676-E51AD8094F5E}" type="datetimeFigureOut">
               <a:rPr lang="en-US" smtClean="0"/>
-              <a:t>5/1/24</a:t>
+              <a:t>5/2/24</a:t>
             </a:fld>
             <a:endParaRPr lang="en-US"/>
           </a:p>
@@ -2389,7 +2389,7 @@
           <a:p>
             <a:fld id="{978706DF-02FA-2C46-8676-E51AD8094F5E}" type="datetimeFigureOut">
               <a:rPr lang="en-US" smtClean="0"/>
-              <a:t>5/1/24</a:t>
+              <a:t>5/2/24</a:t>
             </a:fld>
             <a:endParaRPr lang="en-US"/>
           </a:p>
@@ -2677,7 +2677,7 @@
           <a:p>
             <a:fld id="{978706DF-02FA-2C46-8676-E51AD8094F5E}" type="datetimeFigureOut">
               <a:rPr lang="en-US" smtClean="0"/>
-              <a:t>5/1/24</a:t>
+              <a:t>5/2/24</a:t>
             </a:fld>
             <a:endParaRPr lang="en-US"/>
           </a:p>
@@ -2918,7 +2918,7 @@
           <a:p>
             <a:fld id="{978706DF-02FA-2C46-8676-E51AD8094F5E}" type="datetimeFigureOut">
               <a:rPr lang="en-US" smtClean="0"/>
-              <a:t>5/1/24</a:t>
+              <a:t>5/2/24</a:t>
             </a:fld>
             <a:endParaRPr lang="en-US"/>
           </a:p>
@@ -6628,7 +6628,7 @@
                   </a:schemeClr>
                 </a:solidFill>
               </a:rPr>
-              <a:t> age and comorbidities</a:t>
+              <a:t> age</a:t>
             </a:r>
           </a:p>
           <a:p>

</xml_diff>